<commit_message>
Correccions en la presentació+critica+modificacions en algunes pantalles i faller del servidor de node+afegida la memòria+imatges per a la memòria i la presentació
</commit_message>
<xml_diff>
--- a/Presentació/Gestió d’una falla frontend.pptx
+++ b/Presentació/Gestió d’una falla frontend.pptx
@@ -11,12 +11,14 @@
     <p:sldId id="264" r:id="rId5"/>
     <p:sldId id="260" r:id="rId6"/>
     <p:sldId id="265" r:id="rId7"/>
-    <p:sldId id="266" r:id="rId8"/>
-    <p:sldId id="269" r:id="rId9"/>
-    <p:sldId id="268" r:id="rId10"/>
-    <p:sldId id="262" r:id="rId11"/>
-    <p:sldId id="261" r:id="rId12"/>
-    <p:sldId id="267" r:id="rId13"/>
+    <p:sldId id="270" r:id="rId8"/>
+    <p:sldId id="266" r:id="rId9"/>
+    <p:sldId id="269" r:id="rId10"/>
+    <p:sldId id="268" r:id="rId11"/>
+    <p:sldId id="262" r:id="rId12"/>
+    <p:sldId id="261" r:id="rId13"/>
+    <p:sldId id="267" r:id="rId14"/>
+    <p:sldId id="271" r:id="rId15"/>
   </p:sldIdLst>
   <p:sldSz cx="12192000" cy="6858000"/>
   <p:notesSz cx="6858000" cy="9144000"/>
@@ -272,7 +274,7 @@
           <a:p>
             <a:fld id="{960FEC7B-8241-48EA-A964-895F2288E349}" type="datetimeFigureOut">
               <a:rPr lang="es-ES" smtClean="0"/>
-              <a:t>26/05/2025</a:t>
+              <a:t>27/05/2025</a:t>
             </a:fld>
             <a:endParaRPr lang="es-ES"/>
           </a:p>
@@ -472,7 +474,7 @@
           <a:p>
             <a:fld id="{960FEC7B-8241-48EA-A964-895F2288E349}" type="datetimeFigureOut">
               <a:rPr lang="es-ES" smtClean="0"/>
-              <a:t>26/05/2025</a:t>
+              <a:t>27/05/2025</a:t>
             </a:fld>
             <a:endParaRPr lang="es-ES"/>
           </a:p>
@@ -682,7 +684,7 @@
           <a:p>
             <a:fld id="{960FEC7B-8241-48EA-A964-895F2288E349}" type="datetimeFigureOut">
               <a:rPr lang="es-ES" smtClean="0"/>
-              <a:t>26/05/2025</a:t>
+              <a:t>27/05/2025</a:t>
             </a:fld>
             <a:endParaRPr lang="es-ES"/>
           </a:p>
@@ -882,7 +884,7 @@
           <a:p>
             <a:fld id="{960FEC7B-8241-48EA-A964-895F2288E349}" type="datetimeFigureOut">
               <a:rPr lang="es-ES" smtClean="0"/>
-              <a:t>26/05/2025</a:t>
+              <a:t>27/05/2025</a:t>
             </a:fld>
             <a:endParaRPr lang="es-ES"/>
           </a:p>
@@ -1158,7 +1160,7 @@
           <a:p>
             <a:fld id="{960FEC7B-8241-48EA-A964-895F2288E349}" type="datetimeFigureOut">
               <a:rPr lang="es-ES" smtClean="0"/>
-              <a:t>26/05/2025</a:t>
+              <a:t>27/05/2025</a:t>
             </a:fld>
             <a:endParaRPr lang="es-ES"/>
           </a:p>
@@ -1426,7 +1428,7 @@
           <a:p>
             <a:fld id="{960FEC7B-8241-48EA-A964-895F2288E349}" type="datetimeFigureOut">
               <a:rPr lang="es-ES" smtClean="0"/>
-              <a:t>26/05/2025</a:t>
+              <a:t>27/05/2025</a:t>
             </a:fld>
             <a:endParaRPr lang="es-ES"/>
           </a:p>
@@ -1841,7 +1843,7 @@
           <a:p>
             <a:fld id="{960FEC7B-8241-48EA-A964-895F2288E349}" type="datetimeFigureOut">
               <a:rPr lang="es-ES" smtClean="0"/>
-              <a:t>26/05/2025</a:t>
+              <a:t>27/05/2025</a:t>
             </a:fld>
             <a:endParaRPr lang="es-ES"/>
           </a:p>
@@ -1983,7 +1985,7 @@
           <a:p>
             <a:fld id="{960FEC7B-8241-48EA-A964-895F2288E349}" type="datetimeFigureOut">
               <a:rPr lang="es-ES" smtClean="0"/>
-              <a:t>26/05/2025</a:t>
+              <a:t>27/05/2025</a:t>
             </a:fld>
             <a:endParaRPr lang="es-ES"/>
           </a:p>
@@ -2096,7 +2098,7 @@
           <a:p>
             <a:fld id="{960FEC7B-8241-48EA-A964-895F2288E349}" type="datetimeFigureOut">
               <a:rPr lang="es-ES" smtClean="0"/>
-              <a:t>26/05/2025</a:t>
+              <a:t>27/05/2025</a:t>
             </a:fld>
             <a:endParaRPr lang="es-ES"/>
           </a:p>
@@ -2409,7 +2411,7 @@
           <a:p>
             <a:fld id="{960FEC7B-8241-48EA-A964-895F2288E349}" type="datetimeFigureOut">
               <a:rPr lang="es-ES" smtClean="0"/>
-              <a:t>26/05/2025</a:t>
+              <a:t>27/05/2025</a:t>
             </a:fld>
             <a:endParaRPr lang="es-ES"/>
           </a:p>
@@ -2698,7 +2700,7 @@
           <a:p>
             <a:fld id="{960FEC7B-8241-48EA-A964-895F2288E349}" type="datetimeFigureOut">
               <a:rPr lang="es-ES" smtClean="0"/>
-              <a:t>26/05/2025</a:t>
+              <a:t>27/05/2025</a:t>
             </a:fld>
             <a:endParaRPr lang="es-ES"/>
           </a:p>
@@ -2941,7 +2943,7 @@
           <a:p>
             <a:fld id="{960FEC7B-8241-48EA-A964-895F2288E349}" type="datetimeFigureOut">
               <a:rPr lang="es-ES" smtClean="0"/>
-              <a:t>26/05/2025</a:t>
+              <a:t>27/05/2025</a:t>
             </a:fld>
             <a:endParaRPr lang="es-ES"/>
           </a:p>
@@ -3473,7 +3475,7 @@
           <p:cNvPr id="2" name="Title 1">
             <a:extLst>
               <a:ext uri="{FF2B5EF4-FFF2-40B4-BE49-F238E27FC236}">
-                <a16:creationId xmlns:a16="http://schemas.microsoft.com/office/drawing/2014/main" id="{794C09E2-7D69-52FB-0999-953955EC03E4}"/>
+                <a16:creationId xmlns:a16="http://schemas.microsoft.com/office/drawing/2014/main" id="{391D3189-996E-75E3-D560-865C85474494}"/>
               </a:ext>
             </a:extLst>
           </p:cNvPr>
@@ -3491,109 +3493,513 @@
           <a:p>
             <a:r>
               <a:rPr lang="ca-ES" noProof="0" dirty="0"/>
-              <a:t>Dificultats i millores futures</a:t>
-            </a:r>
-          </a:p>
-        </p:txBody>
-      </p:sp>
-      <p:sp>
-        <p:nvSpPr>
-          <p:cNvPr id="3" name="Content Placeholder 2">
-            <a:extLst>
-              <a:ext uri="{FF2B5EF4-FFF2-40B4-BE49-F238E27FC236}">
-                <a16:creationId xmlns:a16="http://schemas.microsoft.com/office/drawing/2014/main" id="{B57C6B89-36FF-8378-B25D-BB9042B2DD5E}"/>
-              </a:ext>
-            </a:extLst>
-          </p:cNvPr>
-          <p:cNvSpPr>
-            <a:spLocks noGrp="1"/>
-          </p:cNvSpPr>
+              <a:t>Funcionalitat clau (NFC i QR Implementació)</a:t>
+            </a:r>
+          </a:p>
+        </p:txBody>
+      </p:sp>
+      <p:pic>
+        <p:nvPicPr>
+          <p:cNvPr id="6" name="Content Placeholder 5">
+            <a:extLst>
+              <a:ext uri="{FF2B5EF4-FFF2-40B4-BE49-F238E27FC236}">
+                <a16:creationId xmlns:a16="http://schemas.microsoft.com/office/drawing/2014/main" id="{BA2C6015-3E18-D2CE-5B54-3A42A759459C}"/>
+              </a:ext>
+            </a:extLst>
+          </p:cNvPr>
+          <p:cNvPicPr>
+            <a:picLocks noGrp="1" noChangeAspect="1"/>
+          </p:cNvPicPr>
           <p:nvPr>
             <p:ph idx="1"/>
           </p:nvPr>
-        </p:nvSpPr>
-        <p:spPr/>
-        <p:txBody>
-          <a:bodyPr/>
-          <a:lstStyle/>
-          <a:p>
-            <a:r>
-              <a:rPr lang="ca-ES" noProof="0" dirty="0"/>
-              <a:t>Dificultats:</a:t>
-            </a:r>
-          </a:p>
-          <a:p>
-            <a:pPr marL="0" indent="0">
-              <a:buNone/>
-            </a:pPr>
-            <a:r>
-              <a:rPr lang="ca-ES" noProof="0" dirty="0"/>
-              <a:t>-Adaptar la pantalla del mòbil a horizontal.</a:t>
-            </a:r>
-          </a:p>
-          <a:p>
-            <a:r>
-              <a:rPr lang="ca-ES" noProof="0" dirty="0"/>
-              <a:t>Que he aprés:</a:t>
-            </a:r>
-          </a:p>
-          <a:p>
-            <a:pPr marL="0" indent="0">
-              <a:buNone/>
-            </a:pPr>
-            <a:r>
-              <a:rPr lang="ca-ES" noProof="0" dirty="0"/>
-              <a:t>-Que és la tecnologia nfc i per a que serveix.</a:t>
-            </a:r>
-          </a:p>
-          <a:p>
-            <a:r>
-              <a:rPr lang="ca-ES" noProof="0" dirty="0"/>
-              <a:t>Millores futures:</a:t>
-            </a:r>
-          </a:p>
-          <a:p>
-            <a:pPr marL="0" indent="0">
-              <a:buNone/>
-            </a:pPr>
-            <a:r>
-              <a:rPr lang="ca-ES" noProof="0"/>
-              <a:t>-Passar </a:t>
-            </a:r>
-            <a:r>
-              <a:rPr lang="ca-ES" noProof="0" dirty="0"/>
-              <a:t>del servidor de Node a Odoo mitjançant jsonrpc.</a:t>
-            </a:r>
-          </a:p>
-          <a:p>
-            <a:pPr marL="0" indent="0">
-              <a:buNone/>
-            </a:pPr>
-            <a:r>
-              <a:rPr lang="ca-ES" noProof="0" dirty="0"/>
-              <a:t>-Compatibilitat en </a:t>
-            </a:r>
-            <a:r>
-              <a:rPr lang="ca-ES" dirty="0"/>
-              <a:t>iOS</a:t>
-            </a:r>
-            <a:r>
-              <a:rPr lang="ca-ES" noProof="0" dirty="0"/>
-              <a:t>.</a:t>
-            </a:r>
-          </a:p>
-        </p:txBody>
-      </p:sp>
+        </p:nvPicPr>
+        <p:blipFill>
+          <a:blip r:embed="rId2">
+            <a:extLst>
+              <a:ext uri="{28A0092B-C50C-407E-A947-70E740481C1C}">
+                <a14:useLocalDpi xmlns:a14="http://schemas.microsoft.com/office/drawing/2010/main" val="0"/>
+              </a:ext>
+            </a:extLst>
+          </a:blip>
+          <a:stretch>
+            <a:fillRect/>
+          </a:stretch>
+        </p:blipFill>
+        <p:spPr>
+          <a:xfrm>
+            <a:off x="3603173" y="1825625"/>
+            <a:ext cx="1949943" cy="4351338"/>
+          </a:xfrm>
+        </p:spPr>
+      </p:pic>
+      <p:pic>
+        <p:nvPicPr>
+          <p:cNvPr id="5" name="Content Placeholder 4">
+            <a:extLst>
+              <a:ext uri="{FF2B5EF4-FFF2-40B4-BE49-F238E27FC236}">
+                <a16:creationId xmlns:a16="http://schemas.microsoft.com/office/drawing/2014/main" id="{4D77545C-72F8-AD9D-3CB4-BA89405E48A7}"/>
+              </a:ext>
+            </a:extLst>
+          </p:cNvPr>
+          <p:cNvPicPr>
+            <a:picLocks noChangeAspect="1"/>
+          </p:cNvPicPr>
+          <p:nvPr/>
+        </p:nvPicPr>
+        <p:blipFill>
+          <a:blip r:embed="rId3">
+            <a:extLst>
+              <a:ext uri="{28A0092B-C50C-407E-A947-70E740481C1C}">
+                <a14:useLocalDpi xmlns:a14="http://schemas.microsoft.com/office/drawing/2010/main" val="0"/>
+              </a:ext>
+            </a:extLst>
+          </a:blip>
+          <a:stretch>
+            <a:fillRect/>
+          </a:stretch>
+        </p:blipFill>
+        <p:spPr>
+          <a:xfrm>
+            <a:off x="838200" y="1825625"/>
+            <a:ext cx="1949943" cy="4351338"/>
+          </a:xfrm>
+          <a:prstGeom prst="rect">
+            <a:avLst/>
+          </a:prstGeom>
+        </p:spPr>
+      </p:pic>
+      <p:pic>
+        <p:nvPicPr>
+          <p:cNvPr id="7" name="Picture 6">
+            <a:extLst>
+              <a:ext uri="{FF2B5EF4-FFF2-40B4-BE49-F238E27FC236}">
+                <a16:creationId xmlns:a16="http://schemas.microsoft.com/office/drawing/2014/main" id="{E7C3170E-76B2-5801-6172-22203A74D82E}"/>
+              </a:ext>
+            </a:extLst>
+          </p:cNvPr>
+          <p:cNvPicPr>
+            <a:picLocks noChangeAspect="1"/>
+          </p:cNvPicPr>
+          <p:nvPr/>
+        </p:nvPicPr>
+        <p:blipFill>
+          <a:blip r:embed="rId4">
+            <a:extLst>
+              <a:ext uri="{28A0092B-C50C-407E-A947-70E740481C1C}">
+                <a14:useLocalDpi xmlns:a14="http://schemas.microsoft.com/office/drawing/2010/main" val="0"/>
+              </a:ext>
+            </a:extLst>
+          </a:blip>
+          <a:stretch>
+            <a:fillRect/>
+          </a:stretch>
+        </p:blipFill>
+        <p:spPr>
+          <a:xfrm>
+            <a:off x="6638886" y="1825625"/>
+            <a:ext cx="1949944" cy="4351338"/>
+          </a:xfrm>
+          <a:prstGeom prst="rect">
+            <a:avLst/>
+          </a:prstGeom>
+        </p:spPr>
+      </p:pic>
+      <p:pic>
+        <p:nvPicPr>
+          <p:cNvPr id="9" name="Picture 8">
+            <a:extLst>
+              <a:ext uri="{FF2B5EF4-FFF2-40B4-BE49-F238E27FC236}">
+                <a16:creationId xmlns:a16="http://schemas.microsoft.com/office/drawing/2014/main" id="{5FE341B7-D230-42C6-C184-F6FE86AE9A3F}"/>
+              </a:ext>
+            </a:extLst>
+          </p:cNvPr>
+          <p:cNvPicPr>
+            <a:picLocks noChangeAspect="1"/>
+          </p:cNvPicPr>
+          <p:nvPr/>
+        </p:nvPicPr>
+        <p:blipFill>
+          <a:blip r:embed="rId5">
+            <a:extLst>
+              <a:ext uri="{28A0092B-C50C-407E-A947-70E740481C1C}">
+                <a14:useLocalDpi xmlns:a14="http://schemas.microsoft.com/office/drawing/2010/main" val="0"/>
+              </a:ext>
+            </a:extLst>
+          </a:blip>
+          <a:stretch>
+            <a:fillRect/>
+          </a:stretch>
+        </p:blipFill>
+        <p:spPr>
+          <a:xfrm>
+            <a:off x="9674600" y="1825625"/>
+            <a:ext cx="1949945" cy="4351343"/>
+          </a:xfrm>
+          <a:prstGeom prst="rect">
+            <a:avLst/>
+          </a:prstGeom>
+        </p:spPr>
+      </p:pic>
     </p:spTree>
     <p:extLst>
       <p:ext uri="{BB962C8B-B14F-4D97-AF65-F5344CB8AC3E}">
-        <p14:creationId xmlns:p14="http://schemas.microsoft.com/office/powerpoint/2010/main" val="1908790075"/>
+        <p14:creationId xmlns:p14="http://schemas.microsoft.com/office/powerpoint/2010/main" val="2115783585"/>
       </p:ext>
     </p:extLst>
   </p:cSld>
   <p:clrMapOvr>
     <a:masterClrMapping/>
   </p:clrMapOvr>
+  <p:timing>
+    <p:tnLst>
+      <p:par>
+        <p:cTn id="1" dur="indefinite" restart="never" nodeType="tmRoot">
+          <p:childTnLst>
+            <p:seq concurrent="1" nextAc="seek">
+              <p:cTn id="2" dur="indefinite" nodeType="mainSeq">
+                <p:childTnLst>
+                  <p:par>
+                    <p:cTn id="3" fill="hold">
+                      <p:stCondLst>
+                        <p:cond delay="indefinite"/>
+                      </p:stCondLst>
+                      <p:childTnLst>
+                        <p:par>
+                          <p:cTn id="4" fill="hold">
+                            <p:stCondLst>
+                              <p:cond delay="0"/>
+                            </p:stCondLst>
+                            <p:childTnLst>
+                              <p:par>
+                                <p:cTn id="5" presetID="31" presetClass="entr" presetSubtype="0" fill="hold" nodeType="clickEffect">
+                                  <p:stCondLst>
+                                    <p:cond delay="0"/>
+                                  </p:stCondLst>
+                                  <p:childTnLst>
+                                    <p:set>
+                                      <p:cBhvr>
+                                        <p:cTn id="6" dur="1" fill="hold">
+                                          <p:stCondLst>
+                                            <p:cond delay="0"/>
+                                          </p:stCondLst>
+                                        </p:cTn>
+                                        <p:tgtEl>
+                                          <p:spTgt spid="5"/>
+                                        </p:tgtEl>
+                                        <p:attrNameLst>
+                                          <p:attrName>style.visibility</p:attrName>
+                                        </p:attrNameLst>
+                                      </p:cBhvr>
+                                      <p:to>
+                                        <p:strVal val="visible"/>
+                                      </p:to>
+                                    </p:set>
+                                    <p:anim calcmode="lin" valueType="num">
+                                      <p:cBhvr>
+                                        <p:cTn id="7" dur="1000" fill="hold"/>
+                                        <p:tgtEl>
+                                          <p:spTgt spid="5"/>
+                                        </p:tgtEl>
+                                        <p:attrNameLst>
+                                          <p:attrName>ppt_w</p:attrName>
+                                        </p:attrNameLst>
+                                      </p:cBhvr>
+                                      <p:tavLst>
+                                        <p:tav tm="0">
+                                          <p:val>
+                                            <p:fltVal val="0"/>
+                                          </p:val>
+                                        </p:tav>
+                                        <p:tav tm="100000">
+                                          <p:val>
+                                            <p:strVal val="#ppt_w"/>
+                                          </p:val>
+                                        </p:tav>
+                                      </p:tavLst>
+                                    </p:anim>
+                                    <p:anim calcmode="lin" valueType="num">
+                                      <p:cBhvr>
+                                        <p:cTn id="8" dur="1000" fill="hold"/>
+                                        <p:tgtEl>
+                                          <p:spTgt spid="5"/>
+                                        </p:tgtEl>
+                                        <p:attrNameLst>
+                                          <p:attrName>ppt_h</p:attrName>
+                                        </p:attrNameLst>
+                                      </p:cBhvr>
+                                      <p:tavLst>
+                                        <p:tav tm="0">
+                                          <p:val>
+                                            <p:fltVal val="0"/>
+                                          </p:val>
+                                        </p:tav>
+                                        <p:tav tm="100000">
+                                          <p:val>
+                                            <p:strVal val="#ppt_h"/>
+                                          </p:val>
+                                        </p:tav>
+                                      </p:tavLst>
+                                    </p:anim>
+                                    <p:anim calcmode="lin" valueType="num">
+                                      <p:cBhvr>
+                                        <p:cTn id="9" dur="1000" fill="hold"/>
+                                        <p:tgtEl>
+                                          <p:spTgt spid="5"/>
+                                        </p:tgtEl>
+                                        <p:attrNameLst>
+                                          <p:attrName>style.rotation</p:attrName>
+                                        </p:attrNameLst>
+                                      </p:cBhvr>
+                                      <p:tavLst>
+                                        <p:tav tm="0">
+                                          <p:val>
+                                            <p:fltVal val="90"/>
+                                          </p:val>
+                                        </p:tav>
+                                        <p:tav tm="100000">
+                                          <p:val>
+                                            <p:fltVal val="0"/>
+                                          </p:val>
+                                        </p:tav>
+                                      </p:tavLst>
+                                    </p:anim>
+                                    <p:animEffect transition="in" filter="fade">
+                                      <p:cBhvr>
+                                        <p:cTn id="10" dur="1000"/>
+                                        <p:tgtEl>
+                                          <p:spTgt spid="5"/>
+                                        </p:tgtEl>
+                                      </p:cBhvr>
+                                    </p:animEffect>
+                                  </p:childTnLst>
+                                </p:cTn>
+                              </p:par>
+                            </p:childTnLst>
+                          </p:cTn>
+                        </p:par>
+                      </p:childTnLst>
+                    </p:cTn>
+                  </p:par>
+                  <p:par>
+                    <p:cTn id="11" fill="hold">
+                      <p:stCondLst>
+                        <p:cond delay="indefinite"/>
+                      </p:stCondLst>
+                      <p:childTnLst>
+                        <p:par>
+                          <p:cTn id="12" fill="hold">
+                            <p:stCondLst>
+                              <p:cond delay="0"/>
+                            </p:stCondLst>
+                            <p:childTnLst>
+                              <p:par>
+                                <p:cTn id="13" presetID="22" presetClass="entr" presetSubtype="4" fill="hold" nodeType="clickEffect">
+                                  <p:stCondLst>
+                                    <p:cond delay="0"/>
+                                  </p:stCondLst>
+                                  <p:childTnLst>
+                                    <p:set>
+                                      <p:cBhvr>
+                                        <p:cTn id="14" dur="1" fill="hold">
+                                          <p:stCondLst>
+                                            <p:cond delay="0"/>
+                                          </p:stCondLst>
+                                        </p:cTn>
+                                        <p:tgtEl>
+                                          <p:spTgt spid="6"/>
+                                        </p:tgtEl>
+                                        <p:attrNameLst>
+                                          <p:attrName>style.visibility</p:attrName>
+                                        </p:attrNameLst>
+                                      </p:cBhvr>
+                                      <p:to>
+                                        <p:strVal val="visible"/>
+                                      </p:to>
+                                    </p:set>
+                                    <p:animEffect transition="in" filter="wipe(down)">
+                                      <p:cBhvr>
+                                        <p:cTn id="15" dur="500"/>
+                                        <p:tgtEl>
+                                          <p:spTgt spid="6"/>
+                                        </p:tgtEl>
+                                      </p:cBhvr>
+                                    </p:animEffect>
+                                  </p:childTnLst>
+                                </p:cTn>
+                              </p:par>
+                            </p:childTnLst>
+                          </p:cTn>
+                        </p:par>
+                      </p:childTnLst>
+                    </p:cTn>
+                  </p:par>
+                  <p:par>
+                    <p:cTn id="16" fill="hold">
+                      <p:stCondLst>
+                        <p:cond delay="indefinite"/>
+                      </p:stCondLst>
+                      <p:childTnLst>
+                        <p:par>
+                          <p:cTn id="17" fill="hold">
+                            <p:stCondLst>
+                              <p:cond delay="0"/>
+                            </p:stCondLst>
+                            <p:childTnLst>
+                              <p:par>
+                                <p:cTn id="18" presetID="14" presetClass="entr" presetSubtype="10" fill="hold" nodeType="clickEffect">
+                                  <p:stCondLst>
+                                    <p:cond delay="0"/>
+                                  </p:stCondLst>
+                                  <p:childTnLst>
+                                    <p:set>
+                                      <p:cBhvr>
+                                        <p:cTn id="19" dur="1" fill="hold">
+                                          <p:stCondLst>
+                                            <p:cond delay="0"/>
+                                          </p:stCondLst>
+                                        </p:cTn>
+                                        <p:tgtEl>
+                                          <p:spTgt spid="7"/>
+                                        </p:tgtEl>
+                                        <p:attrNameLst>
+                                          <p:attrName>style.visibility</p:attrName>
+                                        </p:attrNameLst>
+                                      </p:cBhvr>
+                                      <p:to>
+                                        <p:strVal val="visible"/>
+                                      </p:to>
+                                    </p:set>
+                                    <p:animEffect transition="in" filter="randombar(horizontal)">
+                                      <p:cBhvr>
+                                        <p:cTn id="20" dur="500"/>
+                                        <p:tgtEl>
+                                          <p:spTgt spid="7"/>
+                                        </p:tgtEl>
+                                      </p:cBhvr>
+                                    </p:animEffect>
+                                  </p:childTnLst>
+                                </p:cTn>
+                              </p:par>
+                            </p:childTnLst>
+                          </p:cTn>
+                        </p:par>
+                      </p:childTnLst>
+                    </p:cTn>
+                  </p:par>
+                  <p:par>
+                    <p:cTn id="21" fill="hold">
+                      <p:stCondLst>
+                        <p:cond delay="indefinite"/>
+                      </p:stCondLst>
+                      <p:childTnLst>
+                        <p:par>
+                          <p:cTn id="22" fill="hold">
+                            <p:stCondLst>
+                              <p:cond delay="0"/>
+                            </p:stCondLst>
+                            <p:childTnLst>
+                              <p:par>
+                                <p:cTn id="23" presetID="2" presetClass="entr" presetSubtype="4" fill="hold" nodeType="clickEffect">
+                                  <p:stCondLst>
+                                    <p:cond delay="0"/>
+                                  </p:stCondLst>
+                                  <p:childTnLst>
+                                    <p:set>
+                                      <p:cBhvr>
+                                        <p:cTn id="24" dur="1" fill="hold">
+                                          <p:stCondLst>
+                                            <p:cond delay="0"/>
+                                          </p:stCondLst>
+                                        </p:cTn>
+                                        <p:tgtEl>
+                                          <p:spTgt spid="9"/>
+                                        </p:tgtEl>
+                                        <p:attrNameLst>
+                                          <p:attrName>style.visibility</p:attrName>
+                                        </p:attrNameLst>
+                                      </p:cBhvr>
+                                      <p:to>
+                                        <p:strVal val="visible"/>
+                                      </p:to>
+                                    </p:set>
+                                    <p:anim calcmode="lin" valueType="num">
+                                      <p:cBhvr additive="base">
+                                        <p:cTn id="25" dur="500" fill="hold"/>
+                                        <p:tgtEl>
+                                          <p:spTgt spid="9"/>
+                                        </p:tgtEl>
+                                        <p:attrNameLst>
+                                          <p:attrName>ppt_x</p:attrName>
+                                        </p:attrNameLst>
+                                      </p:cBhvr>
+                                      <p:tavLst>
+                                        <p:tav tm="0">
+                                          <p:val>
+                                            <p:strVal val="#ppt_x"/>
+                                          </p:val>
+                                        </p:tav>
+                                        <p:tav tm="100000">
+                                          <p:val>
+                                            <p:strVal val="#ppt_x"/>
+                                          </p:val>
+                                        </p:tav>
+                                      </p:tavLst>
+                                    </p:anim>
+                                    <p:anim calcmode="lin" valueType="num">
+                                      <p:cBhvr additive="base">
+                                        <p:cTn id="26" dur="500" fill="hold"/>
+                                        <p:tgtEl>
+                                          <p:spTgt spid="9"/>
+                                        </p:tgtEl>
+                                        <p:attrNameLst>
+                                          <p:attrName>ppt_y</p:attrName>
+                                        </p:attrNameLst>
+                                      </p:cBhvr>
+                                      <p:tavLst>
+                                        <p:tav tm="0">
+                                          <p:val>
+                                            <p:strVal val="1+#ppt_h/2"/>
+                                          </p:val>
+                                        </p:tav>
+                                        <p:tav tm="100000">
+                                          <p:val>
+                                            <p:strVal val="#ppt_y"/>
+                                          </p:val>
+                                        </p:tav>
+                                      </p:tavLst>
+                                    </p:anim>
+                                  </p:childTnLst>
+                                </p:cTn>
+                              </p:par>
+                            </p:childTnLst>
+                          </p:cTn>
+                        </p:par>
+                      </p:childTnLst>
+                    </p:cTn>
+                  </p:par>
+                </p:childTnLst>
+              </p:cTn>
+              <p:prevCondLst>
+                <p:cond evt="onPrev" delay="0">
+                  <p:tgtEl>
+                    <p:sldTgt/>
+                  </p:tgtEl>
+                </p:cond>
+              </p:prevCondLst>
+              <p:nextCondLst>
+                <p:cond evt="onNext" delay="0">
+                  <p:tgtEl>
+                    <p:sldTgt/>
+                  </p:tgtEl>
+                </p:cond>
+              </p:nextCondLst>
+            </p:seq>
+          </p:childTnLst>
+        </p:cTn>
+      </p:par>
+    </p:tnLst>
+  </p:timing>
 </p:sld>
 </file>
 
@@ -3619,7 +4025,7 @@
           <p:cNvPr id="2" name="Title 1">
             <a:extLst>
               <a:ext uri="{FF2B5EF4-FFF2-40B4-BE49-F238E27FC236}">
-                <a16:creationId xmlns:a16="http://schemas.microsoft.com/office/drawing/2014/main" id="{EE19D80B-A0E0-0513-1959-208435FDE9F2}"/>
+                <a16:creationId xmlns:a16="http://schemas.microsoft.com/office/drawing/2014/main" id="{794C09E2-7D69-52FB-0999-953955EC03E4}"/>
               </a:ext>
             </a:extLst>
           </p:cNvPr>
@@ -3637,7 +4043,7 @@
           <a:p>
             <a:r>
               <a:rPr lang="ca-ES" noProof="0" dirty="0"/>
-              <a:t>Annex</a:t>
+              <a:t>Dificultats i millores futures</a:t>
             </a:r>
           </a:p>
         </p:txBody>
@@ -3647,7 +4053,7 @@
           <p:cNvPr id="3" name="Content Placeholder 2">
             <a:extLst>
               <a:ext uri="{FF2B5EF4-FFF2-40B4-BE49-F238E27FC236}">
-                <a16:creationId xmlns:a16="http://schemas.microsoft.com/office/drawing/2014/main" id="{598E38F8-92F0-A36E-D62B-11729FA6363D}"/>
+                <a16:creationId xmlns:a16="http://schemas.microsoft.com/office/drawing/2014/main" id="{B57C6B89-36FF-8378-B25D-BB9042B2DD5E}"/>
               </a:ext>
             </a:extLst>
           </p:cNvPr>
@@ -3665,22 +4071,71 @@
           <a:p>
             <a:r>
               <a:rPr lang="ca-ES" noProof="0" dirty="0"/>
-              <a:t>El repositori del projecte en Github: </a:t>
-            </a:r>
-            <a:r>
-              <a:rPr lang="ca-ES" sz="2000" noProof="0" dirty="0"/>
-              <a:t>https://github.com/JoelFusterBosch/Projecte_Final_DAM_Gestio-_d_una_falla</a:t>
-            </a:r>
-          </a:p>
-          <a:p>
-            <a:endParaRPr lang="ca-ES" noProof="0" dirty="0"/>
+              <a:t>Dificultats:</a:t>
+            </a:r>
+          </a:p>
+          <a:p>
+            <a:pPr marL="0" indent="0">
+              <a:buNone/>
+            </a:pPr>
+            <a:r>
+              <a:rPr lang="ca-ES" noProof="0" dirty="0"/>
+              <a:t>-Adaptar la pantalla del mòbil per a que no es sobreisca </a:t>
+            </a:r>
+            <a:r>
+              <a:rPr lang="ca-ES" dirty="0"/>
+              <a:t>en</a:t>
+            </a:r>
+            <a:r>
+              <a:rPr lang="ca-ES" noProof="0" dirty="0"/>
+              <a:t> horizontal.</a:t>
+            </a:r>
+          </a:p>
+          <a:p>
+            <a:r>
+              <a:rPr lang="ca-ES" noProof="0" dirty="0"/>
+              <a:t>Que he aprés:</a:t>
+            </a:r>
+          </a:p>
+          <a:p>
+            <a:pPr marL="0" indent="0">
+              <a:buNone/>
+            </a:pPr>
+            <a:r>
+              <a:rPr lang="ca-ES" noProof="0" dirty="0"/>
+              <a:t>-Que és la tecnologia nfc i per a que serveix.</a:t>
+            </a:r>
+          </a:p>
+          <a:p>
+            <a:r>
+              <a:rPr lang="ca-ES" noProof="0" dirty="0"/>
+              <a:t>Millores futures:</a:t>
+            </a:r>
+          </a:p>
+          <a:p>
+            <a:pPr marL="0" indent="0">
+              <a:buNone/>
+            </a:pPr>
+            <a:r>
+              <a:rPr lang="ca-ES" noProof="0" dirty="0"/>
+              <a:t>-Passar del servidor de Node a Odoo mitjançant jsonrpc.</a:t>
+            </a:r>
+          </a:p>
+          <a:p>
+            <a:pPr marL="0" indent="0">
+              <a:buNone/>
+            </a:pPr>
+            <a:r>
+              <a:rPr lang="ca-ES" noProof="0" dirty="0"/>
+              <a:t>-Compatibilitat en iOS.</a:t>
+            </a:r>
           </a:p>
         </p:txBody>
       </p:sp>
     </p:spTree>
     <p:extLst>
       <p:ext uri="{BB962C8B-B14F-4D97-AF65-F5344CB8AC3E}">
-        <p14:creationId xmlns:p14="http://schemas.microsoft.com/office/powerpoint/2010/main" val="1584943363"/>
+        <p14:creationId xmlns:p14="http://schemas.microsoft.com/office/powerpoint/2010/main" val="1908790075"/>
       </p:ext>
     </p:extLst>
   </p:cSld>
@@ -3712,6 +4167,102 @@
           <p:cNvPr id="2" name="Title 1">
             <a:extLst>
               <a:ext uri="{FF2B5EF4-FFF2-40B4-BE49-F238E27FC236}">
+                <a16:creationId xmlns:a16="http://schemas.microsoft.com/office/drawing/2014/main" id="{EE19D80B-A0E0-0513-1959-208435FDE9F2}"/>
+              </a:ext>
+            </a:extLst>
+          </p:cNvPr>
+          <p:cNvSpPr>
+            <a:spLocks noGrp="1"/>
+          </p:cNvSpPr>
+          <p:nvPr>
+            <p:ph type="title"/>
+          </p:nvPr>
+        </p:nvSpPr>
+        <p:spPr/>
+        <p:txBody>
+          <a:bodyPr/>
+          <a:lstStyle/>
+          <a:p>
+            <a:r>
+              <a:rPr lang="ca-ES" noProof="0" dirty="0"/>
+              <a:t>Annex</a:t>
+            </a:r>
+          </a:p>
+        </p:txBody>
+      </p:sp>
+      <p:sp>
+        <p:nvSpPr>
+          <p:cNvPr id="3" name="Content Placeholder 2">
+            <a:extLst>
+              <a:ext uri="{FF2B5EF4-FFF2-40B4-BE49-F238E27FC236}">
+                <a16:creationId xmlns:a16="http://schemas.microsoft.com/office/drawing/2014/main" id="{598E38F8-92F0-A36E-D62B-11729FA6363D}"/>
+              </a:ext>
+            </a:extLst>
+          </p:cNvPr>
+          <p:cNvSpPr>
+            <a:spLocks noGrp="1"/>
+          </p:cNvSpPr>
+          <p:nvPr>
+            <p:ph idx="1"/>
+          </p:nvPr>
+        </p:nvSpPr>
+        <p:spPr/>
+        <p:txBody>
+          <a:bodyPr/>
+          <a:lstStyle/>
+          <a:p>
+            <a:r>
+              <a:rPr lang="ca-ES" noProof="0" dirty="0"/>
+              <a:t>El repositori del projecte en Github: </a:t>
+            </a:r>
+            <a:r>
+              <a:rPr lang="ca-ES" sz="2000" noProof="0" dirty="0">
+                <a:hlinkClick r:id="rId2"/>
+              </a:rPr>
+              <a:t>https://github.com/JoelFusterBosch/Projecte_Final_DAM_Gestio-_d_una_falla</a:t>
+            </a:r>
+            <a:endParaRPr lang="ca-ES" sz="2000" noProof="0" dirty="0"/>
+          </a:p>
+          <a:p>
+            <a:endParaRPr lang="ca-ES" noProof="0" dirty="0"/>
+          </a:p>
+        </p:txBody>
+      </p:sp>
+    </p:spTree>
+    <p:extLst>
+      <p:ext uri="{BB962C8B-B14F-4D97-AF65-F5344CB8AC3E}">
+        <p14:creationId xmlns:p14="http://schemas.microsoft.com/office/powerpoint/2010/main" val="1584943363"/>
+      </p:ext>
+    </p:extLst>
+  </p:cSld>
+  <p:clrMapOvr>
+    <a:masterClrMapping/>
+  </p:clrMapOvr>
+</p:sld>
+</file>
+
+<file path=ppt/slides/slide13.xml><?xml version="1.0" encoding="utf-8"?>
+<p:sld xmlns:a="http://schemas.openxmlformats.org/drawingml/2006/main" xmlns:r="http://schemas.openxmlformats.org/officeDocument/2006/relationships" xmlns:p="http://schemas.openxmlformats.org/presentationml/2006/main">
+  <p:cSld>
+    <p:spTree>
+      <p:nvGrpSpPr>
+        <p:cNvPr id="1" name=""/>
+        <p:cNvGrpSpPr/>
+        <p:nvPr/>
+      </p:nvGrpSpPr>
+      <p:grpSpPr>
+        <a:xfrm>
+          <a:off x="0" y="0"/>
+          <a:ext cx="0" cy="0"/>
+          <a:chOff x="0" y="0"/>
+          <a:chExt cx="0" cy="0"/>
+        </a:xfrm>
+      </p:grpSpPr>
+      <p:sp>
+        <p:nvSpPr>
+          <p:cNvPr id="2" name="Title 1">
+            <a:extLst>
+              <a:ext uri="{FF2B5EF4-FFF2-40B4-BE49-F238E27FC236}">
                 <a16:creationId xmlns:a16="http://schemas.microsoft.com/office/drawing/2014/main" id="{65CF10F9-5A3A-8BDD-0C8F-C53C3C7DFF1C}"/>
               </a:ext>
             </a:extLst>
@@ -3775,6 +4326,205 @@
     <p:extLst>
       <p:ext uri="{BB962C8B-B14F-4D97-AF65-F5344CB8AC3E}">
         <p14:creationId xmlns:p14="http://schemas.microsoft.com/office/powerpoint/2010/main" val="2751849124"/>
+      </p:ext>
+    </p:extLst>
+  </p:cSld>
+  <p:clrMapOvr>
+    <a:masterClrMapping/>
+  </p:clrMapOvr>
+</p:sld>
+</file>
+
+<file path=ppt/slides/slide14.xml><?xml version="1.0" encoding="utf-8"?>
+<p:sld xmlns:a="http://schemas.openxmlformats.org/drawingml/2006/main" xmlns:r="http://schemas.openxmlformats.org/officeDocument/2006/relationships" xmlns:p="http://schemas.openxmlformats.org/presentationml/2006/main">
+  <p:cSld>
+    <p:spTree>
+      <p:nvGrpSpPr>
+        <p:cNvPr id="1" name=""/>
+        <p:cNvGrpSpPr/>
+        <p:nvPr/>
+      </p:nvGrpSpPr>
+      <p:grpSpPr>
+        <a:xfrm>
+          <a:off x="0" y="0"/>
+          <a:ext cx="0" cy="0"/>
+          <a:chOff x="0" y="0"/>
+          <a:chExt cx="0" cy="0"/>
+        </a:xfrm>
+      </p:grpSpPr>
+      <p:sp>
+        <p:nvSpPr>
+          <p:cNvPr id="2" name="Title 1">
+            <a:extLst>
+              <a:ext uri="{FF2B5EF4-FFF2-40B4-BE49-F238E27FC236}">
+                <a16:creationId xmlns:a16="http://schemas.microsoft.com/office/drawing/2014/main" id="{B1B1E843-50A9-96CE-789C-5FF712DF4AFC}"/>
+              </a:ext>
+            </a:extLst>
+          </p:cNvPr>
+          <p:cNvSpPr>
+            <a:spLocks noGrp="1"/>
+          </p:cNvSpPr>
+          <p:nvPr>
+            <p:ph type="title"/>
+          </p:nvPr>
+        </p:nvSpPr>
+        <p:spPr/>
+        <p:txBody>
+          <a:bodyPr/>
+          <a:lstStyle/>
+          <a:p>
+            <a:r>
+              <a:rPr lang="es-ES" dirty="0"/>
+              <a:t>Critiques(</a:t>
+            </a:r>
+            <a:r>
+              <a:rPr lang="es-ES" dirty="0" err="1"/>
+              <a:t>Escrit</a:t>
+            </a:r>
+            <a:r>
+              <a:rPr lang="es-ES" dirty="0"/>
+              <a:t> per José </a:t>
+            </a:r>
+            <a:r>
+              <a:rPr lang="es-ES"/>
+              <a:t>Alfredo profesor de PMDM)</a:t>
+            </a:r>
+            <a:endParaRPr lang="es-ES" dirty="0"/>
+          </a:p>
+        </p:txBody>
+      </p:sp>
+      <p:sp>
+        <p:nvSpPr>
+          <p:cNvPr id="3" name="Content Placeholder 2">
+            <a:extLst>
+              <a:ext uri="{FF2B5EF4-FFF2-40B4-BE49-F238E27FC236}">
+                <a16:creationId xmlns:a16="http://schemas.microsoft.com/office/drawing/2014/main" id="{3668B170-7298-BEAA-DEF2-4AD0878B4E06}"/>
+              </a:ext>
+            </a:extLst>
+          </p:cNvPr>
+          <p:cNvSpPr>
+            <a:spLocks noGrp="1"/>
+          </p:cNvSpPr>
+          <p:nvPr>
+            <p:ph idx="1"/>
+          </p:nvPr>
+        </p:nvSpPr>
+        <p:spPr/>
+        <p:txBody>
+          <a:bodyPr/>
+          <a:lstStyle/>
+          <a:p>
+            <a:r>
+              <a:rPr lang="es-ES" dirty="0"/>
+              <a:t>- Has </a:t>
+            </a:r>
+            <a:r>
+              <a:rPr lang="es-ES" dirty="0" err="1"/>
+              <a:t>anat</a:t>
+            </a:r>
+            <a:r>
+              <a:rPr lang="es-ES" dirty="0"/>
+              <a:t> directe </a:t>
+            </a:r>
+            <a:r>
+              <a:rPr lang="es-ES" dirty="0" err="1"/>
+              <a:t>als</a:t>
+            </a:r>
+            <a:r>
+              <a:rPr lang="es-ES" dirty="0"/>
+              <a:t> </a:t>
+            </a:r>
+            <a:r>
+              <a:rPr lang="es-ES" dirty="0" err="1"/>
+              <a:t>prototips</a:t>
+            </a:r>
+            <a:r>
+              <a:rPr lang="es-ES" dirty="0"/>
+              <a:t>, pero no has </a:t>
+            </a:r>
+            <a:r>
+              <a:rPr lang="es-ES" dirty="0" err="1"/>
+              <a:t>explicat</a:t>
+            </a:r>
+            <a:r>
+              <a:rPr lang="es-ES" dirty="0"/>
+              <a:t> de que va </a:t>
+            </a:r>
+            <a:r>
+              <a:rPr lang="es-ES" dirty="0" err="1"/>
+              <a:t>l'aplicacio</a:t>
+            </a:r>
+            <a:r>
+              <a:rPr lang="es-ES" dirty="0"/>
+              <a:t>. Per al </a:t>
+            </a:r>
+            <a:r>
+              <a:rPr lang="es-ES" dirty="0" err="1"/>
+              <a:t>projecte</a:t>
+            </a:r>
+            <a:r>
+              <a:rPr lang="es-ES" dirty="0"/>
+              <a:t> </a:t>
+            </a:r>
+            <a:r>
+              <a:rPr lang="es-ES" dirty="0" err="1"/>
+              <a:t>recorda-te'n</a:t>
+            </a:r>
+            <a:r>
+              <a:rPr lang="es-ES" dirty="0"/>
+              <a:t> </a:t>
+            </a:r>
+            <a:r>
+              <a:rPr lang="es-ES" dirty="0" err="1"/>
+              <a:t>d'explicar</a:t>
+            </a:r>
+            <a:r>
+              <a:rPr lang="es-ES" dirty="0"/>
+              <a:t> primer per que fas </a:t>
+            </a:r>
+            <a:r>
+              <a:rPr lang="es-ES" dirty="0" err="1"/>
+              <a:t>l'aplicacio</a:t>
+            </a:r>
+            <a:r>
+              <a:rPr lang="es-ES" dirty="0"/>
+              <a:t>.</a:t>
+            </a:r>
+            <a:br>
+              <a:rPr lang="es-ES" dirty="0"/>
+            </a:br>
+            <a:r>
+              <a:rPr lang="es-ES" dirty="0"/>
+              <a:t>- Explicar </a:t>
+            </a:r>
+            <a:r>
+              <a:rPr lang="es-ES" dirty="0" err="1"/>
+              <a:t>millor</a:t>
+            </a:r>
+            <a:r>
+              <a:rPr lang="es-ES" dirty="0"/>
+              <a:t> les </a:t>
+            </a:r>
+            <a:r>
+              <a:rPr lang="es-ES" dirty="0" err="1"/>
+              <a:t>funcionalitats</a:t>
+            </a:r>
+            <a:r>
+              <a:rPr lang="es-ES" dirty="0"/>
+              <a:t> que vas a </a:t>
+            </a:r>
+            <a:r>
+              <a:rPr lang="es-ES" dirty="0" err="1"/>
+              <a:t>fer</a:t>
+            </a:r>
+            <a:endParaRPr lang="es-ES" dirty="0"/>
+          </a:p>
+        </p:txBody>
+      </p:sp>
+    </p:spTree>
+    <p:extLst>
+      <p:ext uri="{BB962C8B-B14F-4D97-AF65-F5344CB8AC3E}">
+        <p14:creationId xmlns:p14="http://schemas.microsoft.com/office/powerpoint/2010/main" val="2201422118"/>
       </p:ext>
     </p:extLst>
   </p:cSld>
@@ -4867,7 +5617,7 @@
           <a:lstStyle/>
           <a:p>
             <a:r>
-              <a:rPr lang="es-ES" dirty="0"/>
+              <a:rPr lang="ca-ES" noProof="0" dirty="0"/>
               <a:t>Arquitectura CLEAN</a:t>
             </a:r>
           </a:p>
@@ -5656,6 +6406,93 @@
           <p:cNvPr id="2" name="Title 1">
             <a:extLst>
               <a:ext uri="{FF2B5EF4-FFF2-40B4-BE49-F238E27FC236}">
+                <a16:creationId xmlns:a16="http://schemas.microsoft.com/office/drawing/2014/main" id="{80E16EAC-8C57-BFF8-7E3B-7EE1B7C05A78}"/>
+              </a:ext>
+            </a:extLst>
+          </p:cNvPr>
+          <p:cNvSpPr>
+            <a:spLocks noGrp="1"/>
+          </p:cNvSpPr>
+          <p:nvPr>
+            <p:ph type="title"/>
+          </p:nvPr>
+        </p:nvSpPr>
+        <p:spPr/>
+        <p:txBody>
+          <a:bodyPr/>
+          <a:lstStyle/>
+          <a:p>
+            <a:r>
+              <a:rPr lang="ca-ES" noProof="0" dirty="0"/>
+              <a:t>Funcionalitat clau (Pantalles segons el rol)</a:t>
+            </a:r>
+          </a:p>
+        </p:txBody>
+      </p:sp>
+      <p:pic>
+        <p:nvPicPr>
+          <p:cNvPr id="5" name="Content Placeholder 4">
+            <a:extLst>
+              <a:ext uri="{FF2B5EF4-FFF2-40B4-BE49-F238E27FC236}">
+                <a16:creationId xmlns:a16="http://schemas.microsoft.com/office/drawing/2014/main" id="{95189740-0EA5-43EE-E915-64A89C5D1817}"/>
+              </a:ext>
+            </a:extLst>
+          </p:cNvPr>
+          <p:cNvPicPr>
+            <a:picLocks noGrp="1" noChangeAspect="1"/>
+          </p:cNvPicPr>
+          <p:nvPr>
+            <p:ph idx="1"/>
+          </p:nvPr>
+        </p:nvPicPr>
+        <p:blipFill>
+          <a:blip r:embed="rId2"/>
+          <a:stretch>
+            <a:fillRect/>
+          </a:stretch>
+        </p:blipFill>
+        <p:spPr>
+          <a:xfrm>
+            <a:off x="2832496" y="1815793"/>
+            <a:ext cx="6527007" cy="4351338"/>
+          </a:xfrm>
+        </p:spPr>
+      </p:pic>
+    </p:spTree>
+    <p:extLst>
+      <p:ext uri="{BB962C8B-B14F-4D97-AF65-F5344CB8AC3E}">
+        <p14:creationId xmlns:p14="http://schemas.microsoft.com/office/powerpoint/2010/main" val="2931387786"/>
+      </p:ext>
+    </p:extLst>
+  </p:cSld>
+  <p:clrMapOvr>
+    <a:masterClrMapping/>
+  </p:clrMapOvr>
+</p:sld>
+</file>
+
+<file path=ppt/slides/slide8.xml><?xml version="1.0" encoding="utf-8"?>
+<p:sld xmlns:a="http://schemas.openxmlformats.org/drawingml/2006/main" xmlns:r="http://schemas.openxmlformats.org/officeDocument/2006/relationships" xmlns:p="http://schemas.openxmlformats.org/presentationml/2006/main">
+  <p:cSld>
+    <p:spTree>
+      <p:nvGrpSpPr>
+        <p:cNvPr id="1" name=""/>
+        <p:cNvGrpSpPr/>
+        <p:nvPr/>
+      </p:nvGrpSpPr>
+      <p:grpSpPr>
+        <a:xfrm>
+          <a:off x="0" y="0"/>
+          <a:ext cx="0" cy="0"/>
+          <a:chOff x="0" y="0"/>
+          <a:chExt cx="0" cy="0"/>
+        </a:xfrm>
+      </p:grpSpPr>
+      <p:sp>
+        <p:nvSpPr>
+          <p:cNvPr id="2" name="Title 1">
+            <a:extLst>
+              <a:ext uri="{FF2B5EF4-FFF2-40B4-BE49-F238E27FC236}">
                 <a16:creationId xmlns:a16="http://schemas.microsoft.com/office/drawing/2014/main" id="{7B56765D-89A6-D68B-8CB4-6F9B92A13227}"/>
               </a:ext>
             </a:extLst>
@@ -5743,24 +6580,8 @@
           <a:lstStyle/>
           <a:p>
             <a:r>
-              <a:rPr lang="es-ES" dirty="0"/>
-              <a:t>NFC(</a:t>
-            </a:r>
-            <a:r>
-              <a:rPr lang="es-ES" dirty="0" err="1"/>
-              <a:t>Near</a:t>
-            </a:r>
-            <a:r>
-              <a:rPr lang="es-ES" dirty="0"/>
-              <a:t>-Field-</a:t>
-            </a:r>
-            <a:r>
-              <a:rPr lang="es-ES" dirty="0" err="1"/>
-              <a:t>Communication</a:t>
-            </a:r>
-            <a:r>
-              <a:rPr lang="es-ES" dirty="0"/>
-              <a:t> )</a:t>
+              <a:rPr lang="ca-ES" noProof="0" dirty="0"/>
+              <a:t>NFC(Near-Field-Communication )</a:t>
             </a:r>
           </a:p>
         </p:txBody>
@@ -6633,7 +7454,7 @@
 </p:sld>
 </file>
 
-<file path=ppt/slides/slide8.xml><?xml version="1.0" encoding="utf-8"?>
+<file path=ppt/slides/slide9.xml><?xml version="1.0" encoding="utf-8"?>
 <p:sld xmlns:a="http://schemas.openxmlformats.org/drawingml/2006/main" xmlns:r="http://schemas.openxmlformats.org/officeDocument/2006/relationships" xmlns:p="http://schemas.openxmlformats.org/presentationml/2006/main">
   <p:cSld>
     <p:spTree>
@@ -6675,7 +7496,6 @@
               <a:rPr lang="ca-ES" noProof="0" dirty="0"/>
               <a:t>Funcionalitat clau (QR Explicació)</a:t>
             </a:r>
-            <a:endParaRPr lang="es-ES" dirty="0"/>
           </a:p>
         </p:txBody>
       </p:sp>
@@ -6747,20 +7567,12 @@
           <a:lstStyle/>
           <a:p>
             <a:r>
-              <a:rPr lang="es-ES" dirty="0"/>
-              <a:t>QR(Quick-Response-</a:t>
-            </a:r>
-            <a:r>
-              <a:rPr lang="es-ES" dirty="0" err="1"/>
-              <a:t>Code</a:t>
-            </a:r>
-            <a:r>
-              <a:rPr lang="es-ES" dirty="0"/>
-              <a:t>)</a:t>
-            </a:r>
-          </a:p>
-          <a:p>
-            <a:endParaRPr lang="es-ES" dirty="0"/>
+              <a:rPr lang="ca-ES" noProof="0" dirty="0"/>
+              <a:t>QR(Quick-Response-Code)</a:t>
+            </a:r>
+          </a:p>
+          <a:p>
+            <a:endParaRPr lang="ca-ES" noProof="0" dirty="0"/>
           </a:p>
         </p:txBody>
       </p:sp>
@@ -6936,7 +7748,7 @@
         </p:blipFill>
         <p:spPr>
           <a:xfrm>
-            <a:off x="8539383" y="5153893"/>
+            <a:off x="8539383" y="5242381"/>
             <a:ext cx="2828925" cy="1609725"/>
           </a:xfrm>
           <a:prstGeom prst="rect">
@@ -7309,557 +8121,6 @@
                                         </p:tgtEl>
                                       </p:cBhvr>
                                     </p:animEffect>
-                                  </p:childTnLst>
-                                </p:cTn>
-                              </p:par>
-                            </p:childTnLst>
-                          </p:cTn>
-                        </p:par>
-                      </p:childTnLst>
-                    </p:cTn>
-                  </p:par>
-                </p:childTnLst>
-              </p:cTn>
-              <p:prevCondLst>
-                <p:cond evt="onPrev" delay="0">
-                  <p:tgtEl>
-                    <p:sldTgt/>
-                  </p:tgtEl>
-                </p:cond>
-              </p:prevCondLst>
-              <p:nextCondLst>
-                <p:cond evt="onNext" delay="0">
-                  <p:tgtEl>
-                    <p:sldTgt/>
-                  </p:tgtEl>
-                </p:cond>
-              </p:nextCondLst>
-            </p:seq>
-          </p:childTnLst>
-        </p:cTn>
-      </p:par>
-    </p:tnLst>
-  </p:timing>
-</p:sld>
-</file>
-
-<file path=ppt/slides/slide9.xml><?xml version="1.0" encoding="utf-8"?>
-<p:sld xmlns:a="http://schemas.openxmlformats.org/drawingml/2006/main" xmlns:r="http://schemas.openxmlformats.org/officeDocument/2006/relationships" xmlns:p="http://schemas.openxmlformats.org/presentationml/2006/main">
-  <p:cSld>
-    <p:spTree>
-      <p:nvGrpSpPr>
-        <p:cNvPr id="1" name=""/>
-        <p:cNvGrpSpPr/>
-        <p:nvPr/>
-      </p:nvGrpSpPr>
-      <p:grpSpPr>
-        <a:xfrm>
-          <a:off x="0" y="0"/>
-          <a:ext cx="0" cy="0"/>
-          <a:chOff x="0" y="0"/>
-          <a:chExt cx="0" cy="0"/>
-        </a:xfrm>
-      </p:grpSpPr>
-      <p:sp>
-        <p:nvSpPr>
-          <p:cNvPr id="2" name="Title 1">
-            <a:extLst>
-              <a:ext uri="{FF2B5EF4-FFF2-40B4-BE49-F238E27FC236}">
-                <a16:creationId xmlns:a16="http://schemas.microsoft.com/office/drawing/2014/main" id="{391D3189-996E-75E3-D560-865C85474494}"/>
-              </a:ext>
-            </a:extLst>
-          </p:cNvPr>
-          <p:cNvSpPr>
-            <a:spLocks noGrp="1"/>
-          </p:cNvSpPr>
-          <p:nvPr>
-            <p:ph type="title"/>
-          </p:nvPr>
-        </p:nvSpPr>
-        <p:spPr/>
-        <p:txBody>
-          <a:bodyPr/>
-          <a:lstStyle/>
-          <a:p>
-            <a:r>
-              <a:rPr lang="ca-ES" noProof="0" dirty="0"/>
-              <a:t>Funcionalitat clau (NFC i QR Implementació)</a:t>
-            </a:r>
-            <a:endParaRPr lang="es-ES" dirty="0"/>
-          </a:p>
-        </p:txBody>
-      </p:sp>
-      <p:pic>
-        <p:nvPicPr>
-          <p:cNvPr id="6" name="Content Placeholder 5">
-            <a:extLst>
-              <a:ext uri="{FF2B5EF4-FFF2-40B4-BE49-F238E27FC236}">
-                <a16:creationId xmlns:a16="http://schemas.microsoft.com/office/drawing/2014/main" id="{BA2C6015-3E18-D2CE-5B54-3A42A759459C}"/>
-              </a:ext>
-            </a:extLst>
-          </p:cNvPr>
-          <p:cNvPicPr>
-            <a:picLocks noGrp="1" noChangeAspect="1"/>
-          </p:cNvPicPr>
-          <p:nvPr>
-            <p:ph idx="1"/>
-          </p:nvPr>
-        </p:nvPicPr>
-        <p:blipFill>
-          <a:blip r:embed="rId2">
-            <a:extLst>
-              <a:ext uri="{28A0092B-C50C-407E-A947-70E740481C1C}">
-                <a14:useLocalDpi xmlns:a14="http://schemas.microsoft.com/office/drawing/2010/main" val="0"/>
-              </a:ext>
-            </a:extLst>
-          </a:blip>
-          <a:stretch>
-            <a:fillRect/>
-          </a:stretch>
-        </p:blipFill>
-        <p:spPr>
-          <a:xfrm>
-            <a:off x="3603173" y="1825625"/>
-            <a:ext cx="1949943" cy="4351338"/>
-          </a:xfrm>
-        </p:spPr>
-      </p:pic>
-      <p:pic>
-        <p:nvPicPr>
-          <p:cNvPr id="5" name="Content Placeholder 4">
-            <a:extLst>
-              <a:ext uri="{FF2B5EF4-FFF2-40B4-BE49-F238E27FC236}">
-                <a16:creationId xmlns:a16="http://schemas.microsoft.com/office/drawing/2014/main" id="{4D77545C-72F8-AD9D-3CB4-BA89405E48A7}"/>
-              </a:ext>
-            </a:extLst>
-          </p:cNvPr>
-          <p:cNvPicPr>
-            <a:picLocks noChangeAspect="1"/>
-          </p:cNvPicPr>
-          <p:nvPr/>
-        </p:nvPicPr>
-        <p:blipFill>
-          <a:blip r:embed="rId3">
-            <a:extLst>
-              <a:ext uri="{28A0092B-C50C-407E-A947-70E740481C1C}">
-                <a14:useLocalDpi xmlns:a14="http://schemas.microsoft.com/office/drawing/2010/main" val="0"/>
-              </a:ext>
-            </a:extLst>
-          </a:blip>
-          <a:stretch>
-            <a:fillRect/>
-          </a:stretch>
-        </p:blipFill>
-        <p:spPr>
-          <a:xfrm>
-            <a:off x="838200" y="1825625"/>
-            <a:ext cx="1949943" cy="4351338"/>
-          </a:xfrm>
-          <a:prstGeom prst="rect">
-            <a:avLst/>
-          </a:prstGeom>
-        </p:spPr>
-      </p:pic>
-      <p:pic>
-        <p:nvPicPr>
-          <p:cNvPr id="7" name="Picture 6">
-            <a:extLst>
-              <a:ext uri="{FF2B5EF4-FFF2-40B4-BE49-F238E27FC236}">
-                <a16:creationId xmlns:a16="http://schemas.microsoft.com/office/drawing/2014/main" id="{E7C3170E-76B2-5801-6172-22203A74D82E}"/>
-              </a:ext>
-            </a:extLst>
-          </p:cNvPr>
-          <p:cNvPicPr>
-            <a:picLocks noChangeAspect="1"/>
-          </p:cNvPicPr>
-          <p:nvPr/>
-        </p:nvPicPr>
-        <p:blipFill>
-          <a:blip r:embed="rId4">
-            <a:extLst>
-              <a:ext uri="{28A0092B-C50C-407E-A947-70E740481C1C}">
-                <a14:useLocalDpi xmlns:a14="http://schemas.microsoft.com/office/drawing/2010/main" val="0"/>
-              </a:ext>
-            </a:extLst>
-          </a:blip>
-          <a:stretch>
-            <a:fillRect/>
-          </a:stretch>
-        </p:blipFill>
-        <p:spPr>
-          <a:xfrm>
-            <a:off x="6638886" y="1825625"/>
-            <a:ext cx="1949944" cy="4351338"/>
-          </a:xfrm>
-          <a:prstGeom prst="rect">
-            <a:avLst/>
-          </a:prstGeom>
-        </p:spPr>
-      </p:pic>
-      <p:pic>
-        <p:nvPicPr>
-          <p:cNvPr id="9" name="Picture 8">
-            <a:extLst>
-              <a:ext uri="{FF2B5EF4-FFF2-40B4-BE49-F238E27FC236}">
-                <a16:creationId xmlns:a16="http://schemas.microsoft.com/office/drawing/2014/main" id="{5FE341B7-D230-42C6-C184-F6FE86AE9A3F}"/>
-              </a:ext>
-            </a:extLst>
-          </p:cNvPr>
-          <p:cNvPicPr>
-            <a:picLocks noChangeAspect="1"/>
-          </p:cNvPicPr>
-          <p:nvPr/>
-        </p:nvPicPr>
-        <p:blipFill>
-          <a:blip r:embed="rId5">
-            <a:extLst>
-              <a:ext uri="{28A0092B-C50C-407E-A947-70E740481C1C}">
-                <a14:useLocalDpi xmlns:a14="http://schemas.microsoft.com/office/drawing/2010/main" val="0"/>
-              </a:ext>
-            </a:extLst>
-          </a:blip>
-          <a:stretch>
-            <a:fillRect/>
-          </a:stretch>
-        </p:blipFill>
-        <p:spPr>
-          <a:xfrm>
-            <a:off x="9674600" y="1825625"/>
-            <a:ext cx="1949945" cy="4351343"/>
-          </a:xfrm>
-          <a:prstGeom prst="rect">
-            <a:avLst/>
-          </a:prstGeom>
-        </p:spPr>
-      </p:pic>
-    </p:spTree>
-    <p:extLst>
-      <p:ext uri="{BB962C8B-B14F-4D97-AF65-F5344CB8AC3E}">
-        <p14:creationId xmlns:p14="http://schemas.microsoft.com/office/powerpoint/2010/main" val="2115783585"/>
-      </p:ext>
-    </p:extLst>
-  </p:cSld>
-  <p:clrMapOvr>
-    <a:masterClrMapping/>
-  </p:clrMapOvr>
-  <p:timing>
-    <p:tnLst>
-      <p:par>
-        <p:cTn id="1" dur="indefinite" restart="never" nodeType="tmRoot">
-          <p:childTnLst>
-            <p:seq concurrent="1" nextAc="seek">
-              <p:cTn id="2" dur="indefinite" nodeType="mainSeq">
-                <p:childTnLst>
-                  <p:par>
-                    <p:cTn id="3" fill="hold">
-                      <p:stCondLst>
-                        <p:cond delay="indefinite"/>
-                      </p:stCondLst>
-                      <p:childTnLst>
-                        <p:par>
-                          <p:cTn id="4" fill="hold">
-                            <p:stCondLst>
-                              <p:cond delay="0"/>
-                            </p:stCondLst>
-                            <p:childTnLst>
-                              <p:par>
-                                <p:cTn id="5" presetID="31" presetClass="entr" presetSubtype="0" fill="hold" nodeType="clickEffect">
-                                  <p:stCondLst>
-                                    <p:cond delay="0"/>
-                                  </p:stCondLst>
-                                  <p:childTnLst>
-                                    <p:set>
-                                      <p:cBhvr>
-                                        <p:cTn id="6" dur="1" fill="hold">
-                                          <p:stCondLst>
-                                            <p:cond delay="0"/>
-                                          </p:stCondLst>
-                                        </p:cTn>
-                                        <p:tgtEl>
-                                          <p:spTgt spid="5"/>
-                                        </p:tgtEl>
-                                        <p:attrNameLst>
-                                          <p:attrName>style.visibility</p:attrName>
-                                        </p:attrNameLst>
-                                      </p:cBhvr>
-                                      <p:to>
-                                        <p:strVal val="visible"/>
-                                      </p:to>
-                                    </p:set>
-                                    <p:anim calcmode="lin" valueType="num">
-                                      <p:cBhvr>
-                                        <p:cTn id="7" dur="1000" fill="hold"/>
-                                        <p:tgtEl>
-                                          <p:spTgt spid="5"/>
-                                        </p:tgtEl>
-                                        <p:attrNameLst>
-                                          <p:attrName>ppt_w</p:attrName>
-                                        </p:attrNameLst>
-                                      </p:cBhvr>
-                                      <p:tavLst>
-                                        <p:tav tm="0">
-                                          <p:val>
-                                            <p:fltVal val="0"/>
-                                          </p:val>
-                                        </p:tav>
-                                        <p:tav tm="100000">
-                                          <p:val>
-                                            <p:strVal val="#ppt_w"/>
-                                          </p:val>
-                                        </p:tav>
-                                      </p:tavLst>
-                                    </p:anim>
-                                    <p:anim calcmode="lin" valueType="num">
-                                      <p:cBhvr>
-                                        <p:cTn id="8" dur="1000" fill="hold"/>
-                                        <p:tgtEl>
-                                          <p:spTgt spid="5"/>
-                                        </p:tgtEl>
-                                        <p:attrNameLst>
-                                          <p:attrName>ppt_h</p:attrName>
-                                        </p:attrNameLst>
-                                      </p:cBhvr>
-                                      <p:tavLst>
-                                        <p:tav tm="0">
-                                          <p:val>
-                                            <p:fltVal val="0"/>
-                                          </p:val>
-                                        </p:tav>
-                                        <p:tav tm="100000">
-                                          <p:val>
-                                            <p:strVal val="#ppt_h"/>
-                                          </p:val>
-                                        </p:tav>
-                                      </p:tavLst>
-                                    </p:anim>
-                                    <p:anim calcmode="lin" valueType="num">
-                                      <p:cBhvr>
-                                        <p:cTn id="9" dur="1000" fill="hold"/>
-                                        <p:tgtEl>
-                                          <p:spTgt spid="5"/>
-                                        </p:tgtEl>
-                                        <p:attrNameLst>
-                                          <p:attrName>style.rotation</p:attrName>
-                                        </p:attrNameLst>
-                                      </p:cBhvr>
-                                      <p:tavLst>
-                                        <p:tav tm="0">
-                                          <p:val>
-                                            <p:fltVal val="90"/>
-                                          </p:val>
-                                        </p:tav>
-                                        <p:tav tm="100000">
-                                          <p:val>
-                                            <p:fltVal val="0"/>
-                                          </p:val>
-                                        </p:tav>
-                                      </p:tavLst>
-                                    </p:anim>
-                                    <p:animEffect transition="in" filter="fade">
-                                      <p:cBhvr>
-                                        <p:cTn id="10" dur="1000"/>
-                                        <p:tgtEl>
-                                          <p:spTgt spid="5"/>
-                                        </p:tgtEl>
-                                      </p:cBhvr>
-                                    </p:animEffect>
-                                  </p:childTnLst>
-                                </p:cTn>
-                              </p:par>
-                            </p:childTnLst>
-                          </p:cTn>
-                        </p:par>
-                      </p:childTnLst>
-                    </p:cTn>
-                  </p:par>
-                  <p:par>
-                    <p:cTn id="11" fill="hold">
-                      <p:stCondLst>
-                        <p:cond delay="indefinite"/>
-                      </p:stCondLst>
-                      <p:childTnLst>
-                        <p:par>
-                          <p:cTn id="12" fill="hold">
-                            <p:stCondLst>
-                              <p:cond delay="0"/>
-                            </p:stCondLst>
-                            <p:childTnLst>
-                              <p:par>
-                                <p:cTn id="13" presetID="22" presetClass="entr" presetSubtype="4" fill="hold" nodeType="clickEffect">
-                                  <p:stCondLst>
-                                    <p:cond delay="0"/>
-                                  </p:stCondLst>
-                                  <p:childTnLst>
-                                    <p:set>
-                                      <p:cBhvr>
-                                        <p:cTn id="14" dur="1" fill="hold">
-                                          <p:stCondLst>
-                                            <p:cond delay="0"/>
-                                          </p:stCondLst>
-                                        </p:cTn>
-                                        <p:tgtEl>
-                                          <p:spTgt spid="6"/>
-                                        </p:tgtEl>
-                                        <p:attrNameLst>
-                                          <p:attrName>style.visibility</p:attrName>
-                                        </p:attrNameLst>
-                                      </p:cBhvr>
-                                      <p:to>
-                                        <p:strVal val="visible"/>
-                                      </p:to>
-                                    </p:set>
-                                    <p:animEffect transition="in" filter="wipe(down)">
-                                      <p:cBhvr>
-                                        <p:cTn id="15" dur="500"/>
-                                        <p:tgtEl>
-                                          <p:spTgt spid="6"/>
-                                        </p:tgtEl>
-                                      </p:cBhvr>
-                                    </p:animEffect>
-                                  </p:childTnLst>
-                                </p:cTn>
-                              </p:par>
-                            </p:childTnLst>
-                          </p:cTn>
-                        </p:par>
-                      </p:childTnLst>
-                    </p:cTn>
-                  </p:par>
-                  <p:par>
-                    <p:cTn id="16" fill="hold">
-                      <p:stCondLst>
-                        <p:cond delay="indefinite"/>
-                      </p:stCondLst>
-                      <p:childTnLst>
-                        <p:par>
-                          <p:cTn id="17" fill="hold">
-                            <p:stCondLst>
-                              <p:cond delay="0"/>
-                            </p:stCondLst>
-                            <p:childTnLst>
-                              <p:par>
-                                <p:cTn id="18" presetID="14" presetClass="entr" presetSubtype="10" fill="hold" nodeType="clickEffect">
-                                  <p:stCondLst>
-                                    <p:cond delay="0"/>
-                                  </p:stCondLst>
-                                  <p:childTnLst>
-                                    <p:set>
-                                      <p:cBhvr>
-                                        <p:cTn id="19" dur="1" fill="hold">
-                                          <p:stCondLst>
-                                            <p:cond delay="0"/>
-                                          </p:stCondLst>
-                                        </p:cTn>
-                                        <p:tgtEl>
-                                          <p:spTgt spid="7"/>
-                                        </p:tgtEl>
-                                        <p:attrNameLst>
-                                          <p:attrName>style.visibility</p:attrName>
-                                        </p:attrNameLst>
-                                      </p:cBhvr>
-                                      <p:to>
-                                        <p:strVal val="visible"/>
-                                      </p:to>
-                                    </p:set>
-                                    <p:animEffect transition="in" filter="randombar(horizontal)">
-                                      <p:cBhvr>
-                                        <p:cTn id="20" dur="500"/>
-                                        <p:tgtEl>
-                                          <p:spTgt spid="7"/>
-                                        </p:tgtEl>
-                                      </p:cBhvr>
-                                    </p:animEffect>
-                                  </p:childTnLst>
-                                </p:cTn>
-                              </p:par>
-                            </p:childTnLst>
-                          </p:cTn>
-                        </p:par>
-                      </p:childTnLst>
-                    </p:cTn>
-                  </p:par>
-                  <p:par>
-                    <p:cTn id="21" fill="hold">
-                      <p:stCondLst>
-                        <p:cond delay="indefinite"/>
-                      </p:stCondLst>
-                      <p:childTnLst>
-                        <p:par>
-                          <p:cTn id="22" fill="hold">
-                            <p:stCondLst>
-                              <p:cond delay="0"/>
-                            </p:stCondLst>
-                            <p:childTnLst>
-                              <p:par>
-                                <p:cTn id="23" presetID="2" presetClass="entr" presetSubtype="4" fill="hold" nodeType="clickEffect">
-                                  <p:stCondLst>
-                                    <p:cond delay="0"/>
-                                  </p:stCondLst>
-                                  <p:childTnLst>
-                                    <p:set>
-                                      <p:cBhvr>
-                                        <p:cTn id="24" dur="1" fill="hold">
-                                          <p:stCondLst>
-                                            <p:cond delay="0"/>
-                                          </p:stCondLst>
-                                        </p:cTn>
-                                        <p:tgtEl>
-                                          <p:spTgt spid="9"/>
-                                        </p:tgtEl>
-                                        <p:attrNameLst>
-                                          <p:attrName>style.visibility</p:attrName>
-                                        </p:attrNameLst>
-                                      </p:cBhvr>
-                                      <p:to>
-                                        <p:strVal val="visible"/>
-                                      </p:to>
-                                    </p:set>
-                                    <p:anim calcmode="lin" valueType="num">
-                                      <p:cBhvr additive="base">
-                                        <p:cTn id="25" dur="500" fill="hold"/>
-                                        <p:tgtEl>
-                                          <p:spTgt spid="9"/>
-                                        </p:tgtEl>
-                                        <p:attrNameLst>
-                                          <p:attrName>ppt_x</p:attrName>
-                                        </p:attrNameLst>
-                                      </p:cBhvr>
-                                      <p:tavLst>
-                                        <p:tav tm="0">
-                                          <p:val>
-                                            <p:strVal val="#ppt_x"/>
-                                          </p:val>
-                                        </p:tav>
-                                        <p:tav tm="100000">
-                                          <p:val>
-                                            <p:strVal val="#ppt_x"/>
-                                          </p:val>
-                                        </p:tav>
-                                      </p:tavLst>
-                                    </p:anim>
-                                    <p:anim calcmode="lin" valueType="num">
-                                      <p:cBhvr additive="base">
-                                        <p:cTn id="26" dur="500" fill="hold"/>
-                                        <p:tgtEl>
-                                          <p:spTgt spid="9"/>
-                                        </p:tgtEl>
-                                        <p:attrNameLst>
-                                          <p:attrName>ppt_y</p:attrName>
-                                        </p:attrNameLst>
-                                      </p:cBhvr>
-                                      <p:tavLst>
-                                        <p:tav tm="0">
-                                          <p:val>
-                                            <p:strVal val="1+#ppt_h/2"/>
-                                          </p:val>
-                                        </p:tav>
-                                        <p:tav tm="100000">
-                                          <p:val>
-                                            <p:strVal val="#ppt_y"/>
-                                          </p:val>
-                                        </p:tav>
-                                      </p:tavLst>
-                                    </p:anim>
                                   </p:childTnLst>
                                 </p:cTn>
                               </p:par>

</xml_diff>